<commit_message>
Reducing size of statements for brevity. Increasing font size.
</commit_message>
<xml_diff>
--- a/REVERSE ENGINEER.pptx
+++ b/REVERSE ENGINEER.pptx
@@ -305,7 +305,7 @@
           <a:p>
             <a:fld id="{946DC31E-96AB-4743-B2EC-D315CE7F56CF}" type="datetimeFigureOut">
               <a:rPr lang="en-US" smtClean="0"/>
-              <a:t>6/7/2017</a:t>
+              <a:t>6/9/2017</a:t>
             </a:fld>
             <a:endParaRPr lang="en-US"/>
           </a:p>
@@ -475,7 +475,7 @@
           <a:p>
             <a:fld id="{946DC31E-96AB-4743-B2EC-D315CE7F56CF}" type="datetimeFigureOut">
               <a:rPr lang="en-US" smtClean="0"/>
-              <a:t>6/7/2017</a:t>
+              <a:t>6/9/2017</a:t>
             </a:fld>
             <a:endParaRPr lang="en-US"/>
           </a:p>
@@ -655,7 +655,7 @@
           <a:p>
             <a:fld id="{946DC31E-96AB-4743-B2EC-D315CE7F56CF}" type="datetimeFigureOut">
               <a:rPr lang="en-US" smtClean="0"/>
-              <a:t>6/7/2017</a:t>
+              <a:t>6/9/2017</a:t>
             </a:fld>
             <a:endParaRPr lang="en-US"/>
           </a:p>
@@ -825,7 +825,7 @@
           <a:p>
             <a:fld id="{946DC31E-96AB-4743-B2EC-D315CE7F56CF}" type="datetimeFigureOut">
               <a:rPr lang="en-US" smtClean="0"/>
-              <a:t>6/7/2017</a:t>
+              <a:t>6/9/2017</a:t>
             </a:fld>
             <a:endParaRPr lang="en-US"/>
           </a:p>
@@ -1071,7 +1071,7 @@
           <a:p>
             <a:fld id="{946DC31E-96AB-4743-B2EC-D315CE7F56CF}" type="datetimeFigureOut">
               <a:rPr lang="en-US" smtClean="0"/>
-              <a:t>6/7/2017</a:t>
+              <a:t>6/9/2017</a:t>
             </a:fld>
             <a:endParaRPr lang="en-US"/>
           </a:p>
@@ -1303,7 +1303,7 @@
           <a:p>
             <a:fld id="{946DC31E-96AB-4743-B2EC-D315CE7F56CF}" type="datetimeFigureOut">
               <a:rPr lang="en-US" smtClean="0"/>
-              <a:t>6/7/2017</a:t>
+              <a:t>6/9/2017</a:t>
             </a:fld>
             <a:endParaRPr lang="en-US"/>
           </a:p>
@@ -1670,7 +1670,7 @@
           <a:p>
             <a:fld id="{946DC31E-96AB-4743-B2EC-D315CE7F56CF}" type="datetimeFigureOut">
               <a:rPr lang="en-US" smtClean="0"/>
-              <a:t>6/7/2017</a:t>
+              <a:t>6/9/2017</a:t>
             </a:fld>
             <a:endParaRPr lang="en-US"/>
           </a:p>
@@ -1788,7 +1788,7 @@
           <a:p>
             <a:fld id="{946DC31E-96AB-4743-B2EC-D315CE7F56CF}" type="datetimeFigureOut">
               <a:rPr lang="en-US" smtClean="0"/>
-              <a:t>6/7/2017</a:t>
+              <a:t>6/9/2017</a:t>
             </a:fld>
             <a:endParaRPr lang="en-US"/>
           </a:p>
@@ -1883,7 +1883,7 @@
           <a:p>
             <a:fld id="{946DC31E-96AB-4743-B2EC-D315CE7F56CF}" type="datetimeFigureOut">
               <a:rPr lang="en-US" smtClean="0"/>
-              <a:t>6/7/2017</a:t>
+              <a:t>6/9/2017</a:t>
             </a:fld>
             <a:endParaRPr lang="en-US"/>
           </a:p>
@@ -2160,7 +2160,7 @@
           <a:p>
             <a:fld id="{946DC31E-96AB-4743-B2EC-D315CE7F56CF}" type="datetimeFigureOut">
               <a:rPr lang="en-US" smtClean="0"/>
-              <a:t>6/7/2017</a:t>
+              <a:t>6/9/2017</a:t>
             </a:fld>
             <a:endParaRPr lang="en-US"/>
           </a:p>
@@ -2413,7 +2413,7 @@
           <a:p>
             <a:fld id="{946DC31E-96AB-4743-B2EC-D315CE7F56CF}" type="datetimeFigureOut">
               <a:rPr lang="en-US" smtClean="0"/>
-              <a:t>6/7/2017</a:t>
+              <a:t>6/9/2017</a:t>
             </a:fld>
             <a:endParaRPr lang="en-US"/>
           </a:p>
@@ -2626,7 +2626,7 @@
           <a:p>
             <a:fld id="{946DC31E-96AB-4743-B2EC-D315CE7F56CF}" type="datetimeFigureOut">
               <a:rPr lang="en-US" smtClean="0"/>
-              <a:t>6/7/2017</a:t>
+              <a:t>6/9/2017</a:t>
             </a:fld>
             <a:endParaRPr lang="en-US"/>
           </a:p>
@@ -5781,7 +5781,7 @@
         <p:spPr>
           <a:xfrm>
             <a:off x="609600" y="2159000"/>
-            <a:ext cx="10972800" cy="2554545"/>
+            <a:ext cx="10972800" cy="2677656"/>
           </a:xfrm>
           <a:prstGeom prst="rect">
             <a:avLst/>
@@ -5799,8 +5799,8 @@
               <a:buChar char="•"/>
             </a:pPr>
             <a:r>
-              <a:rPr lang="en-US" sz="2000" dirty="0" smtClean="0"/>
-              <a:t>It is the lowest level language to the hardware you will typically program.</a:t>
+              <a:rPr lang="en-US" sz="2400" dirty="0" smtClean="0"/>
+              <a:t>It is the lowest level language to the hardware.</a:t>
             </a:r>
           </a:p>
           <a:p>
@@ -5809,8 +5809,8 @@
               <a:buChar char="•"/>
             </a:pPr>
             <a:r>
-              <a:rPr lang="en-US" sz="2000" dirty="0" smtClean="0"/>
-              <a:t>It is not as complicated as some people fear it will be. This is especially true as the microprocessor/microcontroller manufacturers provide excellent documentation for writing software for their products.</a:t>
+              <a:rPr lang="en-US" sz="2400" dirty="0" smtClean="0"/>
+              <a:t>The microprocessor/microcontroller manufacturers provide excellent documentation for writing software for their products.</a:t>
             </a:r>
           </a:p>
           <a:p>
@@ -5819,8 +5819,8 @@
               <a:buChar char="•"/>
             </a:pPr>
             <a:r>
-              <a:rPr lang="en-US" sz="2000" dirty="0" smtClean="0"/>
-              <a:t>As a reverse engineer, you aren’t writing assembly language code, you read assembly language code.</a:t>
+              <a:rPr lang="en-US" sz="2400" dirty="0" smtClean="0"/>
+              <a:t>As a reverse engineer, you read assembly language code.</a:t>
             </a:r>
           </a:p>
           <a:p>
@@ -5829,8 +5829,8 @@
               <a:buChar char="•"/>
             </a:pPr>
             <a:r>
-              <a:rPr lang="en-US" sz="2000" dirty="0" smtClean="0"/>
-              <a:t>Often, the biggest difficulty is dealing with compiler optimizations and obfuscations. These are not a problem in the original source code, but can be a nightmare in the final compiled code.</a:t>
+              <a:rPr lang="en-US" sz="2400" dirty="0" smtClean="0"/>
+              <a:t>The biggest difficulty is dealing with compiler optimizations and obfuscations.</a:t>
             </a:r>
           </a:p>
           <a:p>
@@ -5839,7 +5839,7 @@
               <a:buChar char="•"/>
             </a:pPr>
             <a:r>
-              <a:rPr lang="en-US" sz="2000" dirty="0" smtClean="0"/>
+              <a:rPr lang="en-US" sz="2400" dirty="0" smtClean="0"/>
               <a:t>A lack of symbol files for the code you are reversing increases the detective work on your part.</a:t>
             </a:r>
           </a:p>
@@ -5997,7 +5997,7 @@
         <p:spPr>
           <a:xfrm>
             <a:off x="622300" y="2286000"/>
-            <a:ext cx="10972800" cy="3785652"/>
+            <a:ext cx="10972800" cy="2677656"/>
           </a:xfrm>
           <a:prstGeom prst="rect">
             <a:avLst/>
@@ -6015,8 +6015,8 @@
               <a:buChar char="•"/>
             </a:pPr>
             <a:r>
-              <a:rPr lang="en-US" sz="2000" dirty="0" smtClean="0"/>
-              <a:t>This is one of two places where you read assembly language. The other place is the IDA Pro disassembler.</a:t>
+              <a:rPr lang="en-US" sz="2400" dirty="0" smtClean="0"/>
+              <a:t>Provides you with an active view of a currently running program.</a:t>
             </a:r>
           </a:p>
           <a:p>
@@ -6025,8 +6025,16 @@
               <a:buChar char="•"/>
             </a:pPr>
             <a:r>
-              <a:rPr lang="en-US" sz="2000" dirty="0" smtClean="0"/>
-              <a:t>A debugger provides you with an active view of a currently running program.</a:t>
+              <a:rPr lang="en-US" sz="2400" dirty="0" smtClean="0"/>
+              <a:t>In user-mode, there are a variety of debuggers from which </a:t>
+            </a:r>
+            <a:r>
+              <a:rPr lang="en-US" sz="2400" dirty="0"/>
+              <a:t>to </a:t>
+            </a:r>
+            <a:r>
+              <a:rPr lang="en-US" sz="2400" dirty="0" smtClean="0"/>
+              <a:t>choose.</a:t>
             </a:r>
           </a:p>
           <a:p>
@@ -6035,16 +6043,8 @@
               <a:buChar char="•"/>
             </a:pPr>
             <a:r>
-              <a:rPr lang="en-US" sz="2000" dirty="0" smtClean="0"/>
-              <a:t>In user-mode, there are a variety of debuggers from which </a:t>
-            </a:r>
-            <a:r>
-              <a:rPr lang="en-US" sz="2000" dirty="0"/>
-              <a:t>to </a:t>
-            </a:r>
-            <a:r>
-              <a:rPr lang="en-US" sz="2000" dirty="0" smtClean="0"/>
-              <a:t>choose. No single debugger stands out as an obvious choice.</a:t>
+              <a:rPr lang="en-US" sz="2400" dirty="0" smtClean="0"/>
+              <a:t>In kernel-mode, there is an obvious choice for Windows – WinDbg.</a:t>
             </a:r>
           </a:p>
           <a:p>
@@ -6053,8 +6053,8 @@
               <a:buChar char="•"/>
             </a:pPr>
             <a:r>
-              <a:rPr lang="en-US" sz="2000" dirty="0" smtClean="0"/>
-              <a:t>In kernel-mode, there is an obvious choice for Windows – WinDbg.</a:t>
+              <a:rPr lang="en-US" sz="2400" dirty="0" smtClean="0"/>
+              <a:t>Symbol file locations must be made aware to the debugger.</a:t>
             </a:r>
           </a:p>
           <a:p>
@@ -6063,8 +6063,8 @@
               <a:buChar char="•"/>
             </a:pPr>
             <a:r>
-              <a:rPr lang="en-US" sz="2000" dirty="0" smtClean="0"/>
-              <a:t>Symbol file locations must be made aware to the debugger. This is often done via environment variables or by setting parameters in the debugger or at debugger startup. A debug file often has the location of the symbol file embedded in its binary headers and so finding the symbol file is usually automatic.</a:t>
+              <a:rPr lang="en-US" sz="2400" dirty="0" smtClean="0"/>
+              <a:t>The trace command (t) and the step command (p) are two important commands to learn.</a:t>
             </a:r>
           </a:p>
           <a:p>
@@ -6073,10 +6073,10 @@
               <a:buChar char="•"/>
             </a:pPr>
             <a:r>
-              <a:rPr lang="en-US" sz="2000" dirty="0" smtClean="0"/>
-              <a:t>The trace command and the step command are two important commands to learn. This is followed by the various dump memory and registers commands.</a:t>
-            </a:r>
-            <a:endParaRPr lang="en-US" sz="2000" dirty="0"/>
+              <a:rPr lang="en-US" sz="2400" dirty="0" smtClean="0"/>
+              <a:t>This is followed by the various dump memory and registers commands.</a:t>
+            </a:r>
+            <a:endParaRPr lang="en-US" sz="2400" dirty="0"/>
           </a:p>
         </p:txBody>
       </p:sp>
@@ -8559,8 +8559,8 @@
         </p:nvSpPr>
         <p:spPr>
           <a:xfrm>
-            <a:off x="726510" y="1390389"/>
-            <a:ext cx="1976823" cy="1477328"/>
+            <a:off x="4805422" y="2459504"/>
+            <a:ext cx="2581156" cy="1938992"/>
           </a:xfrm>
           <a:prstGeom prst="rect">
             <a:avLst/>
@@ -8574,41 +8574,41 @@
           <a:lstStyle/>
           <a:p>
             <a:r>
-              <a:rPr lang="en-US" dirty="0" err="1" smtClean="0">
+              <a:rPr lang="en-US" sz="2400" dirty="0" err="1" smtClean="0">
                 <a:latin typeface="Courier New" panose="02070309020205020404" pitchFamily="49" charset="0"/>
                 <a:cs typeface="Courier New" panose="02070309020205020404" pitchFamily="49" charset="0"/>
               </a:rPr>
               <a:t>kd</a:t>
             </a:r>
             <a:r>
-              <a:rPr lang="en-US" dirty="0" smtClean="0">
+              <a:rPr lang="en-US" sz="2400" dirty="0" smtClean="0">
                 <a:latin typeface="Courier New" panose="02070309020205020404" pitchFamily="49" charset="0"/>
                 <a:cs typeface="Courier New" panose="02070309020205020404" pitchFamily="49" charset="0"/>
               </a:rPr>
               <a:t>&gt; r </a:t>
             </a:r>
             <a:r>
-              <a:rPr lang="en-US" dirty="0" err="1" smtClean="0">
+              <a:rPr lang="en-US" sz="2400" dirty="0" err="1" smtClean="0">
                 <a:latin typeface="Courier New" panose="02070309020205020404" pitchFamily="49" charset="0"/>
                 <a:cs typeface="Courier New" panose="02070309020205020404" pitchFamily="49" charset="0"/>
               </a:rPr>
               <a:t>gdtr</a:t>
             </a:r>
-            <a:endParaRPr lang="en-US" dirty="0" smtClean="0">
+            <a:endParaRPr lang="en-US" sz="2400" dirty="0" smtClean="0">
               <a:latin typeface="Courier New" panose="02070309020205020404" pitchFamily="49" charset="0"/>
               <a:cs typeface="Courier New" panose="02070309020205020404" pitchFamily="49" charset="0"/>
             </a:endParaRPr>
           </a:p>
           <a:p>
             <a:r>
-              <a:rPr lang="en-US" dirty="0" err="1" smtClean="0">
+              <a:rPr lang="en-US" sz="2400" dirty="0" err="1" smtClean="0">
                 <a:latin typeface="Courier New" panose="02070309020205020404" pitchFamily="49" charset="0"/>
                 <a:cs typeface="Courier New" panose="02070309020205020404" pitchFamily="49" charset="0"/>
               </a:rPr>
               <a:t>gdtr</a:t>
             </a:r>
             <a:r>
-              <a:rPr lang="en-US" dirty="0" smtClean="0">
+              <a:rPr lang="en-US" sz="2400" dirty="0" smtClean="0">
                 <a:latin typeface="Courier New" panose="02070309020205020404" pitchFamily="49" charset="0"/>
                 <a:cs typeface="Courier New" panose="02070309020205020404" pitchFamily="49" charset="0"/>
               </a:rPr>
@@ -8616,54 +8616,54 @@
             </a:r>
           </a:p>
           <a:p>
-            <a:endParaRPr lang="en-US" dirty="0">
+            <a:endParaRPr lang="en-US" sz="2400" dirty="0">
               <a:latin typeface="Courier New" panose="02070309020205020404" pitchFamily="49" charset="0"/>
               <a:cs typeface="Courier New" panose="02070309020205020404" pitchFamily="49" charset="0"/>
             </a:endParaRPr>
           </a:p>
           <a:p>
             <a:r>
-              <a:rPr lang="en-US" dirty="0" err="1">
+              <a:rPr lang="en-US" sz="2400" dirty="0" err="1">
                 <a:latin typeface="Courier New" panose="02070309020205020404" pitchFamily="49" charset="0"/>
                 <a:cs typeface="Courier New" panose="02070309020205020404" pitchFamily="49" charset="0"/>
               </a:rPr>
               <a:t>kd</a:t>
             </a:r>
             <a:r>
-              <a:rPr lang="en-US" dirty="0">
+              <a:rPr lang="en-US" sz="2400" dirty="0">
                 <a:latin typeface="Courier New" panose="02070309020205020404" pitchFamily="49" charset="0"/>
                 <a:cs typeface="Courier New" panose="02070309020205020404" pitchFamily="49" charset="0"/>
               </a:rPr>
               <a:t>&gt; r </a:t>
             </a:r>
             <a:r>
-              <a:rPr lang="en-US" dirty="0" err="1" smtClean="0">
+              <a:rPr lang="en-US" sz="2400" dirty="0" err="1" smtClean="0">
                 <a:latin typeface="Courier New" panose="02070309020205020404" pitchFamily="49" charset="0"/>
                 <a:cs typeface="Courier New" panose="02070309020205020404" pitchFamily="49" charset="0"/>
               </a:rPr>
               <a:t>gdtl</a:t>
             </a:r>
-            <a:endParaRPr lang="en-US" dirty="0">
+            <a:endParaRPr lang="en-US" sz="2400" dirty="0">
               <a:latin typeface="Courier New" panose="02070309020205020404" pitchFamily="49" charset="0"/>
               <a:cs typeface="Courier New" panose="02070309020205020404" pitchFamily="49" charset="0"/>
             </a:endParaRPr>
           </a:p>
           <a:p>
             <a:r>
-              <a:rPr lang="en-US" dirty="0" err="1" smtClean="0">
+              <a:rPr lang="en-US" sz="2400" dirty="0" err="1" smtClean="0">
                 <a:latin typeface="Courier New" panose="02070309020205020404" pitchFamily="49" charset="0"/>
                 <a:cs typeface="Courier New" panose="02070309020205020404" pitchFamily="49" charset="0"/>
               </a:rPr>
               <a:t>gtdl</a:t>
             </a:r>
             <a:r>
-              <a:rPr lang="en-US" dirty="0" smtClean="0">
+              <a:rPr lang="en-US" sz="2400" dirty="0" smtClean="0">
                 <a:latin typeface="Courier New" panose="02070309020205020404" pitchFamily="49" charset="0"/>
                 <a:cs typeface="Courier New" panose="02070309020205020404" pitchFamily="49" charset="0"/>
               </a:rPr>
               <a:t>=03ff</a:t>
             </a:r>
-            <a:endParaRPr lang="en-US" dirty="0">
+            <a:endParaRPr lang="en-US" sz="2400" dirty="0">
               <a:latin typeface="Courier New" panose="02070309020205020404" pitchFamily="49" charset="0"/>
               <a:cs typeface="Courier New" panose="02070309020205020404" pitchFamily="49" charset="0"/>
             </a:endParaRPr>
@@ -9972,8 +9972,8 @@
         </p:nvSpPr>
         <p:spPr>
           <a:xfrm>
-            <a:off x="726510" y="1390389"/>
-            <a:ext cx="8042586" cy="2308324"/>
+            <a:off x="749824" y="1905506"/>
+            <a:ext cx="10692351" cy="3046988"/>
           </a:xfrm>
           <a:prstGeom prst="rect">
             <a:avLst/>
@@ -9987,14 +9987,14 @@
           <a:lstStyle/>
           <a:p>
             <a:r>
-              <a:rPr lang="en-US" dirty="0" err="1" smtClean="0">
+              <a:rPr lang="en-US" sz="2400" dirty="0" err="1" smtClean="0">
                 <a:latin typeface="Courier New" panose="02070309020205020404" pitchFamily="49" charset="0"/>
                 <a:cs typeface="Courier New" panose="02070309020205020404" pitchFamily="49" charset="0"/>
               </a:rPr>
               <a:t>kd</a:t>
             </a:r>
             <a:r>
-              <a:rPr lang="en-US" dirty="0" smtClean="0">
+              <a:rPr lang="en-US" sz="2400" dirty="0" smtClean="0">
                 <a:latin typeface="Courier New" panose="02070309020205020404" pitchFamily="49" charset="0"/>
                 <a:cs typeface="Courier New" panose="02070309020205020404" pitchFamily="49" charset="0"/>
               </a:rPr>
@@ -10003,49 +10003,49 @@
           </a:p>
           <a:p>
             <a:r>
-              <a:rPr lang="en-US" dirty="0" smtClean="0">
+              <a:rPr lang="en-US" sz="2400" dirty="0" smtClean="0">
                 <a:latin typeface="Courier New" panose="02070309020205020404" pitchFamily="49" charset="0"/>
                 <a:cs typeface="Courier New" panose="02070309020205020404" pitchFamily="49" charset="0"/>
               </a:rPr>
               <a:t>82430000  00 00 00 00 00</a:t>
             </a:r>
             <a:r>
-              <a:rPr lang="en-US" dirty="0">
+              <a:rPr lang="en-US" sz="2400" dirty="0">
                 <a:latin typeface="Courier New" panose="02070309020205020404" pitchFamily="49" charset="0"/>
                 <a:cs typeface="Courier New" panose="02070309020205020404" pitchFamily="49" charset="0"/>
               </a:rPr>
               <a:t> 00 00 </a:t>
             </a:r>
             <a:r>
-              <a:rPr lang="en-US" dirty="0" smtClean="0">
+              <a:rPr lang="en-US" sz="2400" dirty="0" smtClean="0">
                 <a:latin typeface="Courier New" panose="02070309020205020404" pitchFamily="49" charset="0"/>
                 <a:cs typeface="Courier New" panose="02070309020205020404" pitchFamily="49" charset="0"/>
               </a:rPr>
               <a:t>00-ff </a:t>
             </a:r>
             <a:r>
-              <a:rPr lang="en-US" dirty="0" err="1" smtClean="0">
+              <a:rPr lang="en-US" sz="2400" dirty="0" err="1" smtClean="0">
                 <a:latin typeface="Courier New" panose="02070309020205020404" pitchFamily="49" charset="0"/>
                 <a:cs typeface="Courier New" panose="02070309020205020404" pitchFamily="49" charset="0"/>
               </a:rPr>
               <a:t>ff</a:t>
             </a:r>
             <a:r>
-              <a:rPr lang="en-US" dirty="0" smtClean="0">
+              <a:rPr lang="en-US" sz="2400" dirty="0" smtClean="0">
                 <a:latin typeface="Courier New" panose="02070309020205020404" pitchFamily="49" charset="0"/>
                 <a:cs typeface="Courier New" panose="02070309020205020404" pitchFamily="49" charset="0"/>
               </a:rPr>
               <a:t> 00 00 00 9b </a:t>
             </a:r>
             <a:r>
-              <a:rPr lang="en-US" dirty="0" err="1" smtClean="0">
+              <a:rPr lang="en-US" sz="2400" dirty="0" err="1" smtClean="0">
                 <a:latin typeface="Courier New" panose="02070309020205020404" pitchFamily="49" charset="0"/>
                 <a:cs typeface="Courier New" panose="02070309020205020404" pitchFamily="49" charset="0"/>
               </a:rPr>
               <a:t>cf</a:t>
             </a:r>
             <a:r>
-              <a:rPr lang="en-US" dirty="0" smtClean="0">
+              <a:rPr lang="en-US" sz="2400" dirty="0" smtClean="0">
                 <a:latin typeface="Courier New" panose="02070309020205020404" pitchFamily="49" charset="0"/>
                 <a:cs typeface="Courier New" panose="02070309020205020404" pitchFamily="49" charset="0"/>
               </a:rPr>
@@ -10054,77 +10054,77 @@
           </a:p>
           <a:p>
             <a:r>
-              <a:rPr lang="en-US" dirty="0" smtClean="0">
+              <a:rPr lang="en-US" sz="2400" dirty="0" smtClean="0">
                 <a:latin typeface="Courier New" panose="02070309020205020404" pitchFamily="49" charset="0"/>
                 <a:cs typeface="Courier New" panose="02070309020205020404" pitchFamily="49" charset="0"/>
               </a:rPr>
               <a:t>82430010  </a:t>
             </a:r>
             <a:r>
-              <a:rPr lang="en-US" dirty="0" err="1" smtClean="0">
+              <a:rPr lang="en-US" sz="2400" dirty="0" err="1" smtClean="0">
                 <a:latin typeface="Courier New" panose="02070309020205020404" pitchFamily="49" charset="0"/>
                 <a:cs typeface="Courier New" panose="02070309020205020404" pitchFamily="49" charset="0"/>
               </a:rPr>
               <a:t>ff</a:t>
             </a:r>
             <a:r>
-              <a:rPr lang="en-US" dirty="0" smtClean="0">
+              <a:rPr lang="en-US" sz="2400" dirty="0" smtClean="0">
                 <a:latin typeface="Courier New" panose="02070309020205020404" pitchFamily="49" charset="0"/>
                 <a:cs typeface="Courier New" panose="02070309020205020404" pitchFamily="49" charset="0"/>
               </a:rPr>
               <a:t> </a:t>
             </a:r>
             <a:r>
-              <a:rPr lang="en-US" dirty="0" err="1" smtClean="0">
+              <a:rPr lang="en-US" sz="2400" dirty="0" err="1" smtClean="0">
                 <a:latin typeface="Courier New" panose="02070309020205020404" pitchFamily="49" charset="0"/>
                 <a:cs typeface="Courier New" panose="02070309020205020404" pitchFamily="49" charset="0"/>
               </a:rPr>
               <a:t>ff</a:t>
             </a:r>
             <a:r>
-              <a:rPr lang="en-US" dirty="0" smtClean="0">
+              <a:rPr lang="en-US" sz="2400" dirty="0" smtClean="0">
                 <a:latin typeface="Courier New" panose="02070309020205020404" pitchFamily="49" charset="0"/>
                 <a:cs typeface="Courier New" panose="02070309020205020404" pitchFamily="49" charset="0"/>
               </a:rPr>
               <a:t> 00 00 00 93 </a:t>
             </a:r>
             <a:r>
-              <a:rPr lang="en-US" dirty="0" err="1" smtClean="0">
+              <a:rPr lang="en-US" sz="2400" dirty="0" err="1" smtClean="0">
                 <a:latin typeface="Courier New" panose="02070309020205020404" pitchFamily="49" charset="0"/>
                 <a:cs typeface="Courier New" panose="02070309020205020404" pitchFamily="49" charset="0"/>
               </a:rPr>
               <a:t>cf</a:t>
             </a:r>
             <a:r>
-              <a:rPr lang="en-US" dirty="0" smtClean="0">
+              <a:rPr lang="en-US" sz="2400" dirty="0" smtClean="0">
                 <a:latin typeface="Courier New" panose="02070309020205020404" pitchFamily="49" charset="0"/>
                 <a:cs typeface="Courier New" panose="02070309020205020404" pitchFamily="49" charset="0"/>
               </a:rPr>
               <a:t> 00-ff </a:t>
             </a:r>
             <a:r>
-              <a:rPr lang="en-US" dirty="0" err="1" smtClean="0">
+              <a:rPr lang="en-US" sz="2400" dirty="0" err="1" smtClean="0">
                 <a:latin typeface="Courier New" panose="02070309020205020404" pitchFamily="49" charset="0"/>
                 <a:cs typeface="Courier New" panose="02070309020205020404" pitchFamily="49" charset="0"/>
               </a:rPr>
               <a:t>ff</a:t>
             </a:r>
             <a:r>
-              <a:rPr lang="en-US" dirty="0" smtClean="0">
+              <a:rPr lang="en-US" sz="2400" dirty="0" smtClean="0">
                 <a:latin typeface="Courier New" panose="02070309020205020404" pitchFamily="49" charset="0"/>
                 <a:cs typeface="Courier New" panose="02070309020205020404" pitchFamily="49" charset="0"/>
               </a:rPr>
               <a:t> 00 00 00 fb </a:t>
             </a:r>
             <a:r>
-              <a:rPr lang="en-US" dirty="0" err="1" smtClean="0">
+              <a:rPr lang="en-US" sz="2400" dirty="0" err="1" smtClean="0">
                 <a:latin typeface="Courier New" panose="02070309020205020404" pitchFamily="49" charset="0"/>
                 <a:cs typeface="Courier New" panose="02070309020205020404" pitchFamily="49" charset="0"/>
               </a:rPr>
               <a:t>cf</a:t>
             </a:r>
             <a:r>
-              <a:rPr lang="en-US" dirty="0" smtClean="0">
+              <a:rPr lang="en-US" sz="2400" dirty="0" smtClean="0">
                 <a:latin typeface="Courier New" panose="02070309020205020404" pitchFamily="49" charset="0"/>
                 <a:cs typeface="Courier New" panose="02070309020205020404" pitchFamily="49" charset="0"/>
               </a:rPr>
@@ -10133,215 +10133,215 @@
           </a:p>
           <a:p>
             <a:r>
-              <a:rPr lang="en-US" dirty="0" smtClean="0">
+              <a:rPr lang="en-US" sz="2400" dirty="0" smtClean="0">
                 <a:latin typeface="Courier New" panose="02070309020205020404" pitchFamily="49" charset="0"/>
                 <a:cs typeface="Courier New" panose="02070309020205020404" pitchFamily="49" charset="0"/>
               </a:rPr>
               <a:t>82430020  </a:t>
             </a:r>
             <a:r>
-              <a:rPr lang="en-US" dirty="0" err="1">
+              <a:rPr lang="en-US" sz="2400" dirty="0" err="1">
                 <a:latin typeface="Courier New" panose="02070309020205020404" pitchFamily="49" charset="0"/>
                 <a:cs typeface="Courier New" panose="02070309020205020404" pitchFamily="49" charset="0"/>
               </a:rPr>
               <a:t>ff</a:t>
             </a:r>
             <a:r>
-              <a:rPr lang="en-US" dirty="0">
+              <a:rPr lang="en-US" sz="2400" dirty="0">
                 <a:latin typeface="Courier New" panose="02070309020205020404" pitchFamily="49" charset="0"/>
                 <a:cs typeface="Courier New" panose="02070309020205020404" pitchFamily="49" charset="0"/>
               </a:rPr>
               <a:t> </a:t>
             </a:r>
             <a:r>
-              <a:rPr lang="en-US" dirty="0" err="1">
+              <a:rPr lang="en-US" sz="2400" dirty="0" err="1">
                 <a:latin typeface="Courier New" panose="02070309020205020404" pitchFamily="49" charset="0"/>
                 <a:cs typeface="Courier New" panose="02070309020205020404" pitchFamily="49" charset="0"/>
               </a:rPr>
               <a:t>ff</a:t>
             </a:r>
             <a:r>
-              <a:rPr lang="en-US" dirty="0">
+              <a:rPr lang="en-US" sz="2400" dirty="0">
                 <a:latin typeface="Courier New" panose="02070309020205020404" pitchFamily="49" charset="0"/>
                 <a:cs typeface="Courier New" panose="02070309020205020404" pitchFamily="49" charset="0"/>
               </a:rPr>
               <a:t> 00 00 00 </a:t>
             </a:r>
             <a:r>
-              <a:rPr lang="en-US" dirty="0" smtClean="0">
+              <a:rPr lang="en-US" sz="2400" dirty="0" smtClean="0">
                 <a:latin typeface="Courier New" panose="02070309020205020404" pitchFamily="49" charset="0"/>
                 <a:cs typeface="Courier New" panose="02070309020205020404" pitchFamily="49" charset="0"/>
               </a:rPr>
               <a:t>f3 </a:t>
             </a:r>
             <a:r>
-              <a:rPr lang="en-US" dirty="0" err="1">
+              <a:rPr lang="en-US" sz="2400" dirty="0" err="1">
                 <a:latin typeface="Courier New" panose="02070309020205020404" pitchFamily="49" charset="0"/>
                 <a:cs typeface="Courier New" panose="02070309020205020404" pitchFamily="49" charset="0"/>
               </a:rPr>
               <a:t>cf</a:t>
             </a:r>
             <a:r>
-              <a:rPr lang="en-US" dirty="0">
+              <a:rPr lang="en-US" sz="2400" dirty="0">
                 <a:latin typeface="Courier New" panose="02070309020205020404" pitchFamily="49" charset="0"/>
                 <a:cs typeface="Courier New" panose="02070309020205020404" pitchFamily="49" charset="0"/>
               </a:rPr>
               <a:t> </a:t>
             </a:r>
             <a:r>
-              <a:rPr lang="en-US" dirty="0" smtClean="0">
+              <a:rPr lang="en-US" sz="2400" dirty="0" smtClean="0">
                 <a:latin typeface="Courier New" panose="02070309020205020404" pitchFamily="49" charset="0"/>
                 <a:cs typeface="Courier New" panose="02070309020205020404" pitchFamily="49" charset="0"/>
               </a:rPr>
               <a:t>00-ab 20 </a:t>
             </a:r>
             <a:r>
-              <a:rPr lang="en-US" dirty="0">
+              <a:rPr lang="en-US" sz="2400" dirty="0">
                 <a:latin typeface="Courier New" panose="02070309020205020404" pitchFamily="49" charset="0"/>
                 <a:cs typeface="Courier New" panose="02070309020205020404" pitchFamily="49" charset="0"/>
               </a:rPr>
               <a:t>00 </a:t>
             </a:r>
             <a:r>
-              <a:rPr lang="en-US" dirty="0" smtClean="0">
+              <a:rPr lang="en-US" sz="2400" dirty="0" smtClean="0">
                 <a:latin typeface="Courier New" panose="02070309020205020404" pitchFamily="49" charset="0"/>
                 <a:cs typeface="Courier New" panose="02070309020205020404" pitchFamily="49" charset="0"/>
               </a:rPr>
               <a:t>b0 13 8b 00 80</a:t>
             </a:r>
-            <a:endParaRPr lang="en-US" dirty="0">
+            <a:endParaRPr lang="en-US" sz="2400" dirty="0">
               <a:latin typeface="Courier New" panose="02070309020205020404" pitchFamily="49" charset="0"/>
               <a:cs typeface="Courier New" panose="02070309020205020404" pitchFamily="49" charset="0"/>
             </a:endParaRPr>
           </a:p>
           <a:p>
             <a:r>
-              <a:rPr lang="en-US" dirty="0" smtClean="0">
+              <a:rPr lang="en-US" sz="2400" dirty="0" smtClean="0">
                 <a:latin typeface="Courier New" panose="02070309020205020404" pitchFamily="49" charset="0"/>
                 <a:cs typeface="Courier New" panose="02070309020205020404" pitchFamily="49" charset="0"/>
               </a:rPr>
               <a:t>82430030  28 21 </a:t>
             </a:r>
             <a:r>
-              <a:rPr lang="en-US" dirty="0">
+              <a:rPr lang="en-US" sz="2400" dirty="0">
                 <a:latin typeface="Courier New" panose="02070309020205020404" pitchFamily="49" charset="0"/>
                 <a:cs typeface="Courier New" panose="02070309020205020404" pitchFamily="49" charset="0"/>
               </a:rPr>
               <a:t>00 </a:t>
             </a:r>
             <a:r>
-              <a:rPr lang="en-US" dirty="0" smtClean="0">
+              <a:rPr lang="en-US" sz="2400" dirty="0" smtClean="0">
                 <a:latin typeface="Courier New" panose="02070309020205020404" pitchFamily="49" charset="0"/>
                 <a:cs typeface="Courier New" panose="02070309020205020404" pitchFamily="49" charset="0"/>
               </a:rPr>
               <a:t>78 90 </a:t>
             </a:r>
             <a:r>
-              <a:rPr lang="en-US" dirty="0">
+              <a:rPr lang="en-US" sz="2400" dirty="0">
                 <a:latin typeface="Courier New" panose="02070309020205020404" pitchFamily="49" charset="0"/>
                 <a:cs typeface="Courier New" panose="02070309020205020404" pitchFamily="49" charset="0"/>
               </a:rPr>
               <a:t>93 </a:t>
             </a:r>
             <a:r>
-              <a:rPr lang="en-US" dirty="0" smtClean="0">
+              <a:rPr lang="en-US" sz="2400" dirty="0" smtClean="0">
                 <a:latin typeface="Courier New" panose="02070309020205020404" pitchFamily="49" charset="0"/>
                 <a:cs typeface="Courier New" panose="02070309020205020404" pitchFamily="49" charset="0"/>
               </a:rPr>
               <a:t>40 81-ff 0f </a:t>
             </a:r>
             <a:r>
-              <a:rPr lang="en-US" dirty="0">
+              <a:rPr lang="en-US" sz="2400" dirty="0">
                 <a:latin typeface="Courier New" panose="02070309020205020404" pitchFamily="49" charset="0"/>
                 <a:cs typeface="Courier New" panose="02070309020205020404" pitchFamily="49" charset="0"/>
               </a:rPr>
               <a:t>00 </a:t>
             </a:r>
             <a:r>
-              <a:rPr lang="en-US" dirty="0" smtClean="0">
+              <a:rPr lang="en-US" sz="2400" dirty="0" smtClean="0">
                 <a:latin typeface="Courier New" panose="02070309020205020404" pitchFamily="49" charset="0"/>
                 <a:cs typeface="Courier New" panose="02070309020205020404" pitchFamily="49" charset="0"/>
               </a:rPr>
               <a:t>e0 fa f3 40 7f</a:t>
             </a:r>
-            <a:endParaRPr lang="en-US" dirty="0">
+            <a:endParaRPr lang="en-US" sz="2400" dirty="0">
               <a:latin typeface="Courier New" panose="02070309020205020404" pitchFamily="49" charset="0"/>
               <a:cs typeface="Courier New" panose="02070309020205020404" pitchFamily="49" charset="0"/>
             </a:endParaRPr>
           </a:p>
           <a:p>
             <a:r>
-              <a:rPr lang="en-US" dirty="0" smtClean="0">
+              <a:rPr lang="en-US" sz="2400" dirty="0" smtClean="0">
                 <a:latin typeface="Courier New" panose="02070309020205020404" pitchFamily="49" charset="0"/>
                 <a:cs typeface="Courier New" panose="02070309020205020404" pitchFamily="49" charset="0"/>
               </a:rPr>
               <a:t>82430040  </a:t>
             </a:r>
             <a:r>
-              <a:rPr lang="en-US" dirty="0" err="1">
+              <a:rPr lang="en-US" sz="2400" dirty="0" err="1">
                 <a:latin typeface="Courier New" panose="02070309020205020404" pitchFamily="49" charset="0"/>
                 <a:cs typeface="Courier New" panose="02070309020205020404" pitchFamily="49" charset="0"/>
               </a:rPr>
               <a:t>ff</a:t>
             </a:r>
             <a:r>
-              <a:rPr lang="en-US" dirty="0">
+              <a:rPr lang="en-US" sz="2400" dirty="0">
                 <a:latin typeface="Courier New" panose="02070309020205020404" pitchFamily="49" charset="0"/>
                 <a:cs typeface="Courier New" panose="02070309020205020404" pitchFamily="49" charset="0"/>
               </a:rPr>
               <a:t> </a:t>
             </a:r>
             <a:r>
-              <a:rPr lang="en-US" dirty="0" err="1">
+              <a:rPr lang="en-US" sz="2400" dirty="0" err="1">
                 <a:latin typeface="Courier New" panose="02070309020205020404" pitchFamily="49" charset="0"/>
                 <a:cs typeface="Courier New" panose="02070309020205020404" pitchFamily="49" charset="0"/>
               </a:rPr>
               <a:t>ff</a:t>
             </a:r>
             <a:r>
-              <a:rPr lang="en-US" dirty="0">
+              <a:rPr lang="en-US" sz="2400" dirty="0">
                 <a:latin typeface="Courier New" panose="02070309020205020404" pitchFamily="49" charset="0"/>
                 <a:cs typeface="Courier New" panose="02070309020205020404" pitchFamily="49" charset="0"/>
               </a:rPr>
               <a:t> 00 </a:t>
             </a:r>
             <a:r>
-              <a:rPr lang="en-US" dirty="0" smtClean="0">
+              <a:rPr lang="en-US" sz="2400" dirty="0" smtClean="0">
                 <a:latin typeface="Courier New" panose="02070309020205020404" pitchFamily="49" charset="0"/>
                 <a:cs typeface="Courier New" panose="02070309020205020404" pitchFamily="49" charset="0"/>
               </a:rPr>
               <a:t>04 </a:t>
             </a:r>
             <a:r>
-              <a:rPr lang="en-US" dirty="0">
+              <a:rPr lang="en-US" sz="2400" dirty="0">
                 <a:latin typeface="Courier New" panose="02070309020205020404" pitchFamily="49" charset="0"/>
                 <a:cs typeface="Courier New" panose="02070309020205020404" pitchFamily="49" charset="0"/>
               </a:rPr>
               <a:t>00 </a:t>
             </a:r>
             <a:r>
-              <a:rPr lang="en-US" dirty="0" smtClean="0">
+              <a:rPr lang="en-US" sz="2400" dirty="0" smtClean="0">
                 <a:latin typeface="Courier New" panose="02070309020205020404" pitchFamily="49" charset="0"/>
                 <a:cs typeface="Courier New" panose="02070309020205020404" pitchFamily="49" charset="0"/>
               </a:rPr>
               <a:t>f2 00 00-00 00 </a:t>
             </a:r>
             <a:r>
-              <a:rPr lang="en-US" dirty="0">
+              <a:rPr lang="en-US" sz="2400" dirty="0">
                 <a:latin typeface="Courier New" panose="02070309020205020404" pitchFamily="49" charset="0"/>
                 <a:cs typeface="Courier New" panose="02070309020205020404" pitchFamily="49" charset="0"/>
               </a:rPr>
               <a:t>00 00 00 </a:t>
             </a:r>
             <a:r>
-              <a:rPr lang="en-US" dirty="0" smtClean="0">
+              <a:rPr lang="en-US" sz="2400" dirty="0" smtClean="0">
                 <a:latin typeface="Courier New" panose="02070309020205020404" pitchFamily="49" charset="0"/>
                 <a:cs typeface="Courier New" panose="02070309020205020404" pitchFamily="49" charset="0"/>
               </a:rPr>
               <a:t>00 00 </a:t>
             </a:r>
             <a:r>
-              <a:rPr lang="en-US" dirty="0">
+              <a:rPr lang="en-US" sz="2400" dirty="0">
                 <a:latin typeface="Courier New" panose="02070309020205020404" pitchFamily="49" charset="0"/>
                 <a:cs typeface="Courier New" panose="02070309020205020404" pitchFamily="49" charset="0"/>
               </a:rPr>
@@ -10350,75 +10350,75 @@
           </a:p>
           <a:p>
             <a:r>
-              <a:rPr lang="en-US" dirty="0" smtClean="0">
+              <a:rPr lang="en-US" sz="2400" dirty="0" smtClean="0">
                 <a:latin typeface="Courier New" panose="02070309020205020404" pitchFamily="49" charset="0"/>
                 <a:cs typeface="Courier New" panose="02070309020205020404" pitchFamily="49" charset="0"/>
               </a:rPr>
               <a:t>82430050  68 00 </a:t>
             </a:r>
             <a:r>
-              <a:rPr lang="en-US" dirty="0">
+              <a:rPr lang="en-US" sz="2400" dirty="0">
                 <a:latin typeface="Courier New" panose="02070309020205020404" pitchFamily="49" charset="0"/>
                 <a:cs typeface="Courier New" panose="02070309020205020404" pitchFamily="49" charset="0"/>
               </a:rPr>
               <a:t>00 </a:t>
             </a:r>
             <a:r>
-              <a:rPr lang="en-US" dirty="0" smtClean="0">
+              <a:rPr lang="en-US" sz="2400" dirty="0" smtClean="0">
                 <a:latin typeface="Courier New" panose="02070309020205020404" pitchFamily="49" charset="0"/>
                 <a:cs typeface="Courier New" panose="02070309020205020404" pitchFamily="49" charset="0"/>
               </a:rPr>
               <a:t>50 90 89 00 81-68 00 68 50 90 89 00 81</a:t>
             </a:r>
-            <a:endParaRPr lang="en-US" dirty="0">
+            <a:endParaRPr lang="en-US" sz="2400" dirty="0">
               <a:latin typeface="Courier New" panose="02070309020205020404" pitchFamily="49" charset="0"/>
               <a:cs typeface="Courier New" panose="02070309020205020404" pitchFamily="49" charset="0"/>
             </a:endParaRPr>
           </a:p>
           <a:p>
             <a:r>
-              <a:rPr lang="en-US" dirty="0">
+              <a:rPr lang="en-US" sz="2400" dirty="0">
                 <a:latin typeface="Courier New" panose="02070309020205020404" pitchFamily="49" charset="0"/>
                 <a:cs typeface="Courier New" panose="02070309020205020404" pitchFamily="49" charset="0"/>
               </a:rPr>
               <a:t>82430010  </a:t>
             </a:r>
             <a:r>
-              <a:rPr lang="en-US" dirty="0" smtClean="0">
+              <a:rPr lang="en-US" sz="2400" dirty="0" smtClean="0">
                 <a:latin typeface="Courier New" panose="02070309020205020404" pitchFamily="49" charset="0"/>
                 <a:cs typeface="Courier New" panose="02070309020205020404" pitchFamily="49" charset="0"/>
               </a:rPr>
               <a:t>00 00 </a:t>
             </a:r>
             <a:r>
-              <a:rPr lang="en-US" dirty="0">
+              <a:rPr lang="en-US" sz="2400" dirty="0">
                 <a:latin typeface="Courier New" panose="02070309020205020404" pitchFamily="49" charset="0"/>
                 <a:cs typeface="Courier New" panose="02070309020205020404" pitchFamily="49" charset="0"/>
               </a:rPr>
               <a:t>00 00 00 </a:t>
             </a:r>
             <a:r>
-              <a:rPr lang="en-US" dirty="0" smtClean="0">
+              <a:rPr lang="en-US" sz="2400" dirty="0" smtClean="0">
                 <a:latin typeface="Courier New" panose="02070309020205020404" pitchFamily="49" charset="0"/>
                 <a:cs typeface="Courier New" panose="02070309020205020404" pitchFamily="49" charset="0"/>
               </a:rPr>
               <a:t>00 00 00-00 00 </a:t>
             </a:r>
             <a:r>
-              <a:rPr lang="en-US" dirty="0">
+              <a:rPr lang="en-US" sz="2400" dirty="0">
                 <a:latin typeface="Courier New" panose="02070309020205020404" pitchFamily="49" charset="0"/>
                 <a:cs typeface="Courier New" panose="02070309020205020404" pitchFamily="49" charset="0"/>
               </a:rPr>
               <a:t>00 00 00 </a:t>
             </a:r>
             <a:r>
-              <a:rPr lang="en-US" dirty="0" smtClean="0">
+              <a:rPr lang="en-US" sz="2400" dirty="0" smtClean="0">
                 <a:latin typeface="Courier New" panose="02070309020205020404" pitchFamily="49" charset="0"/>
                 <a:cs typeface="Courier New" panose="02070309020205020404" pitchFamily="49" charset="0"/>
               </a:rPr>
               <a:t>00 00 00</a:t>
             </a:r>
-            <a:endParaRPr lang="en-US" dirty="0">
+            <a:endParaRPr lang="en-US" sz="2400" dirty="0">
               <a:latin typeface="Courier New" panose="02070309020205020404" pitchFamily="49" charset="0"/>
               <a:cs typeface="Courier New" panose="02070309020205020404" pitchFamily="49" charset="0"/>
             </a:endParaRPr>
@@ -10553,7 +10553,7 @@
         </p:nvSpPr>
         <p:spPr>
           <a:xfrm>
-            <a:off x="2547593" y="905232"/>
+            <a:off x="2547592" y="905232"/>
             <a:ext cx="7096815" cy="5047536"/>
           </a:xfrm>
           <a:prstGeom prst="rect">

</xml_diff>

<commit_message>
Updated JPGs to include tiny bit more detail.
</commit_message>
<xml_diff>
--- a/REVERSE ENGINEER.pptx
+++ b/REVERSE ENGINEER.pptx
@@ -63,6 +63,8 @@
     <p:sldId id="282" r:id="rId57"/>
     <p:sldId id="283" r:id="rId58"/>
     <p:sldId id="284" r:id="rId59"/>
+    <p:sldId id="314" r:id="rId60"/>
+    <p:sldId id="315" r:id="rId61"/>
   </p:sldIdLst>
   <p:sldSz cx="12192000" cy="6858000"/>
   <p:notesSz cx="6858000" cy="9144000"/>
@@ -311,7 +313,7 @@
           <a:p>
             <a:fld id="{946DC31E-96AB-4743-B2EC-D315CE7F56CF}" type="datetimeFigureOut">
               <a:rPr lang="en-US" smtClean="0"/>
-              <a:t>6/12/2017</a:t>
+              <a:t>7/7/2017</a:t>
             </a:fld>
             <a:endParaRPr lang="en-US"/>
           </a:p>
@@ -481,7 +483,7 @@
           <a:p>
             <a:fld id="{946DC31E-96AB-4743-B2EC-D315CE7F56CF}" type="datetimeFigureOut">
               <a:rPr lang="en-US" smtClean="0"/>
-              <a:t>6/12/2017</a:t>
+              <a:t>7/7/2017</a:t>
             </a:fld>
             <a:endParaRPr lang="en-US"/>
           </a:p>
@@ -661,7 +663,7 @@
           <a:p>
             <a:fld id="{946DC31E-96AB-4743-B2EC-D315CE7F56CF}" type="datetimeFigureOut">
               <a:rPr lang="en-US" smtClean="0"/>
-              <a:t>6/12/2017</a:t>
+              <a:t>7/7/2017</a:t>
             </a:fld>
             <a:endParaRPr lang="en-US"/>
           </a:p>
@@ -831,7 +833,7 @@
           <a:p>
             <a:fld id="{946DC31E-96AB-4743-B2EC-D315CE7F56CF}" type="datetimeFigureOut">
               <a:rPr lang="en-US" smtClean="0"/>
-              <a:t>6/12/2017</a:t>
+              <a:t>7/7/2017</a:t>
             </a:fld>
             <a:endParaRPr lang="en-US"/>
           </a:p>
@@ -1077,7 +1079,7 @@
           <a:p>
             <a:fld id="{946DC31E-96AB-4743-B2EC-D315CE7F56CF}" type="datetimeFigureOut">
               <a:rPr lang="en-US" smtClean="0"/>
-              <a:t>6/12/2017</a:t>
+              <a:t>7/7/2017</a:t>
             </a:fld>
             <a:endParaRPr lang="en-US"/>
           </a:p>
@@ -1309,7 +1311,7 @@
           <a:p>
             <a:fld id="{946DC31E-96AB-4743-B2EC-D315CE7F56CF}" type="datetimeFigureOut">
               <a:rPr lang="en-US" smtClean="0"/>
-              <a:t>6/12/2017</a:t>
+              <a:t>7/7/2017</a:t>
             </a:fld>
             <a:endParaRPr lang="en-US"/>
           </a:p>
@@ -1676,7 +1678,7 @@
           <a:p>
             <a:fld id="{946DC31E-96AB-4743-B2EC-D315CE7F56CF}" type="datetimeFigureOut">
               <a:rPr lang="en-US" smtClean="0"/>
-              <a:t>6/12/2017</a:t>
+              <a:t>7/7/2017</a:t>
             </a:fld>
             <a:endParaRPr lang="en-US"/>
           </a:p>
@@ -1794,7 +1796,7 @@
           <a:p>
             <a:fld id="{946DC31E-96AB-4743-B2EC-D315CE7F56CF}" type="datetimeFigureOut">
               <a:rPr lang="en-US" smtClean="0"/>
-              <a:t>6/12/2017</a:t>
+              <a:t>7/7/2017</a:t>
             </a:fld>
             <a:endParaRPr lang="en-US"/>
           </a:p>
@@ -1889,7 +1891,7 @@
           <a:p>
             <a:fld id="{946DC31E-96AB-4743-B2EC-D315CE7F56CF}" type="datetimeFigureOut">
               <a:rPr lang="en-US" smtClean="0"/>
-              <a:t>6/12/2017</a:t>
+              <a:t>7/7/2017</a:t>
             </a:fld>
             <a:endParaRPr lang="en-US"/>
           </a:p>
@@ -2166,7 +2168,7 @@
           <a:p>
             <a:fld id="{946DC31E-96AB-4743-B2EC-D315CE7F56CF}" type="datetimeFigureOut">
               <a:rPr lang="en-US" smtClean="0"/>
-              <a:t>6/12/2017</a:t>
+              <a:t>7/7/2017</a:t>
             </a:fld>
             <a:endParaRPr lang="en-US"/>
           </a:p>
@@ -2419,7 +2421,7 @@
           <a:p>
             <a:fld id="{946DC31E-96AB-4743-B2EC-D315CE7F56CF}" type="datetimeFigureOut">
               <a:rPr lang="en-US" smtClean="0"/>
-              <a:t>6/12/2017</a:t>
+              <a:t>7/7/2017</a:t>
             </a:fld>
             <a:endParaRPr lang="en-US"/>
           </a:p>
@@ -2632,7 +2634,7 @@
           <a:p>
             <a:fld id="{946DC31E-96AB-4743-B2EC-D315CE7F56CF}" type="datetimeFigureOut">
               <a:rPr lang="en-US" smtClean="0"/>
-              <a:t>6/12/2017</a:t>
+              <a:t>7/7/2017</a:t>
             </a:fld>
             <a:endParaRPr lang="en-US"/>
           </a:p>
@@ -3192,7 +3194,6 @@
               <a:rPr lang="en-US" sz="2800" dirty="0" smtClean="0"/>
               <a:t>Section Objects – Object Body Attributes</a:t>
             </a:r>
-            <a:endParaRPr lang="en-US" sz="2800" dirty="0" smtClean="0"/>
           </a:p>
         </p:txBody>
       </p:sp>
@@ -3690,7 +3691,6 @@
               <a:rPr lang="en-US" sz="2800" dirty="0" smtClean="0"/>
               <a:t>Page Protection</a:t>
             </a:r>
-            <a:endParaRPr lang="en-US" sz="2800" dirty="0" smtClean="0"/>
           </a:p>
         </p:txBody>
       </p:sp>
@@ -3864,7 +3864,6 @@
               <a:rPr lang="en-US" sz="2400" dirty="0"/>
               <a:t>making a copy of the pages until the page is written to.</a:t>
             </a:r>
-            <a:endParaRPr lang="en-US" sz="2400" dirty="0"/>
           </a:p>
         </p:txBody>
       </p:sp>
@@ -4013,7 +4012,6 @@
               <a:rPr lang="en-US" sz="2800" dirty="0" smtClean="0"/>
               <a:t>Page Protection</a:t>
             </a:r>
-            <a:endParaRPr lang="en-US" sz="2800" dirty="0" smtClean="0"/>
           </a:p>
         </p:txBody>
       </p:sp>
@@ -7529,7 +7527,7 @@
         </p:nvSpPr>
         <p:spPr>
           <a:xfrm>
-            <a:off x="4317981" y="3651284"/>
+            <a:off x="4317981" y="3661012"/>
             <a:ext cx="3657600" cy="165100"/>
           </a:xfrm>
           <a:prstGeom prst="rect">
@@ -7570,7 +7568,7 @@
         </p:nvSpPr>
         <p:spPr>
           <a:xfrm>
-            <a:off x="4317989" y="3816369"/>
+            <a:off x="4317989" y="3826097"/>
             <a:ext cx="3657600" cy="165100"/>
           </a:xfrm>
           <a:prstGeom prst="rect">
@@ -7611,7 +7609,7 @@
         </p:nvSpPr>
         <p:spPr>
           <a:xfrm>
-            <a:off x="4317989" y="3979880"/>
+            <a:off x="4317989" y="3989608"/>
             <a:ext cx="3657600" cy="165100"/>
           </a:xfrm>
           <a:prstGeom prst="rect">
@@ -7652,7 +7650,7 @@
         </p:nvSpPr>
         <p:spPr>
           <a:xfrm>
-            <a:off x="4317978" y="4145000"/>
+            <a:off x="4317978" y="4154728"/>
             <a:ext cx="3657600" cy="165100"/>
           </a:xfrm>
           <a:prstGeom prst="rect">
@@ -7693,7 +7691,7 @@
         </p:nvSpPr>
         <p:spPr>
           <a:xfrm>
-            <a:off x="4317978" y="4308511"/>
+            <a:off x="4317978" y="4318239"/>
             <a:ext cx="3657600" cy="165100"/>
           </a:xfrm>
           <a:prstGeom prst="rect">
@@ -7734,7 +7732,7 @@
         </p:nvSpPr>
         <p:spPr>
           <a:xfrm>
-            <a:off x="4317981" y="4473611"/>
+            <a:off x="4317981" y="4483339"/>
             <a:ext cx="3657600" cy="165100"/>
           </a:xfrm>
           <a:prstGeom prst="rect">
@@ -7775,7 +7773,7 @@
         </p:nvSpPr>
         <p:spPr>
           <a:xfrm>
-            <a:off x="4317981" y="4637122"/>
+            <a:off x="4317981" y="4646850"/>
             <a:ext cx="3657600" cy="165100"/>
           </a:xfrm>
           <a:prstGeom prst="rect">
@@ -7816,7 +7814,7 @@
         </p:nvSpPr>
         <p:spPr>
           <a:xfrm>
-            <a:off x="4317970" y="4802242"/>
+            <a:off x="4317970" y="4811970"/>
             <a:ext cx="3657600" cy="165100"/>
           </a:xfrm>
           <a:prstGeom prst="rect">
@@ -7857,7 +7855,7 @@
         </p:nvSpPr>
         <p:spPr>
           <a:xfrm>
-            <a:off x="4317970" y="4965753"/>
+            <a:off x="4317970" y="4985209"/>
             <a:ext cx="3657600" cy="165100"/>
           </a:xfrm>
           <a:prstGeom prst="rect">
@@ -14344,11 +14342,11 @@
           </a:p>
           <a:p>
             <a:r>
-              <a:rPr lang="en-US" sz="2400" dirty="0">
+              <a:rPr lang="en-US" sz="2400" smtClean="0">
                 <a:latin typeface="Courier New" panose="02070309020205020404" pitchFamily="49" charset="0"/>
                 <a:cs typeface="Courier New" panose="02070309020205020404" pitchFamily="49" charset="0"/>
               </a:rPr>
-              <a:t>82430010  </a:t>
+              <a:t>82430060  </a:t>
             </a:r>
             <a:r>
               <a:rPr lang="en-US" sz="2400" dirty="0" smtClean="0">
@@ -15546,7 +15544,7 @@
       </p:sp>
       <p:pic>
         <p:nvPicPr>
-          <p:cNvPr id="9" name="Picture 8"/>
+          <p:cNvPr id="3" name="Picture 2"/>
           <p:cNvPicPr>
             <a:picLocks noChangeAspect="1"/>
           </p:cNvPicPr>
@@ -15566,8 +15564,8 @@
         </p:blipFill>
         <p:spPr>
           <a:xfrm>
-            <a:off x="2302669" y="833773"/>
-            <a:ext cx="7586662" cy="5190454"/>
+            <a:off x="2351307" y="1050323"/>
+            <a:ext cx="7489386" cy="5123903"/>
           </a:xfrm>
           <a:prstGeom prst="rect">
             <a:avLst/>
@@ -23668,7 +23666,7 @@
         </p:nvCxnSpPr>
         <p:spPr>
           <a:xfrm>
-            <a:off x="3940640" y="5580736"/>
+            <a:off x="3960096" y="5580736"/>
             <a:ext cx="5479146" cy="0"/>
           </a:xfrm>
           <a:prstGeom prst="line">
@@ -23706,7 +23704,7 @@
         </p:nvCxnSpPr>
         <p:spPr>
           <a:xfrm>
-            <a:off x="3933386" y="5892790"/>
+            <a:off x="3962570" y="5892790"/>
             <a:ext cx="5479146" cy="0"/>
           </a:xfrm>
           <a:prstGeom prst="line">
@@ -30165,6 +30163,461 @@
 </p:sld>
 </file>
 
+<file path=ppt/slides/slide59.xml><?xml version="1.0" encoding="utf-8"?>
+<p:sld xmlns:a="http://schemas.openxmlformats.org/drawingml/2006/main" xmlns:r="http://schemas.openxmlformats.org/officeDocument/2006/relationships" xmlns:p="http://schemas.openxmlformats.org/presentationml/2006/main" show="0">
+  <p:cSld>
+    <p:spTree>
+      <p:nvGrpSpPr>
+        <p:cNvPr id="1" name=""/>
+        <p:cNvGrpSpPr/>
+        <p:nvPr/>
+      </p:nvGrpSpPr>
+      <p:grpSpPr>
+        <a:xfrm>
+          <a:off x="0" y="0"/>
+          <a:ext cx="0" cy="0"/>
+          <a:chOff x="0" y="0"/>
+          <a:chExt cx="0" cy="0"/>
+        </a:xfrm>
+      </p:grpSpPr>
+      <p:sp>
+        <p:nvSpPr>
+          <p:cNvPr id="2" name="TextBox 1"/>
+          <p:cNvSpPr txBox="1"/>
+          <p:nvPr/>
+        </p:nvSpPr>
+        <p:spPr>
+          <a:xfrm>
+            <a:off x="5822957" y="6184900"/>
+            <a:ext cx="622286" cy="369332"/>
+          </a:xfrm>
+          <a:prstGeom prst="rect">
+            <a:avLst/>
+          </a:prstGeom>
+          <a:noFill/>
+        </p:spPr>
+        <p:txBody>
+          <a:bodyPr wrap="none" rtlCol="0">
+            <a:spAutoFit/>
+          </a:bodyPr>
+          <a:lstStyle/>
+          <a:p>
+            <a:r>
+              <a:rPr lang="en-US" dirty="0" smtClean="0">
+                <a:hlinkClick r:id="rId2" action="ppaction://hlinksldjump"/>
+              </a:rPr>
+              <a:t>Back</a:t>
+            </a:r>
+            <a:endParaRPr lang="en-US" dirty="0"/>
+          </a:p>
+        </p:txBody>
+      </p:sp>
+      <p:sp>
+        <p:nvSpPr>
+          <p:cNvPr id="4" name="Title 1"/>
+          <p:cNvSpPr>
+            <a:spLocks noGrp="1"/>
+          </p:cNvSpPr>
+          <p:nvPr>
+            <p:ph type="title"/>
+          </p:nvPr>
+        </p:nvSpPr>
+        <p:spPr>
+          <a:xfrm>
+            <a:off x="838200" y="365125"/>
+            <a:ext cx="10515600" cy="574675"/>
+          </a:xfrm>
+        </p:spPr>
+        <p:txBody>
+          <a:bodyPr>
+            <a:normAutofit fontScale="90000"/>
+          </a:bodyPr>
+          <a:lstStyle/>
+          <a:p>
+            <a:pPr algn="ctr"/>
+            <a:r>
+              <a:rPr lang="en-US" dirty="0" smtClean="0"/>
+              <a:t>Channel 9</a:t>
+            </a:r>
+            <a:endParaRPr lang="en-US" dirty="0"/>
+          </a:p>
+        </p:txBody>
+      </p:sp>
+      <p:sp>
+        <p:nvSpPr>
+          <p:cNvPr id="3" name="TextBox 2"/>
+          <p:cNvSpPr txBox="1"/>
+          <p:nvPr/>
+        </p:nvSpPr>
+        <p:spPr>
+          <a:xfrm>
+            <a:off x="731520" y="1549400"/>
+            <a:ext cx="5029200" cy="4524315"/>
+          </a:xfrm>
+          <a:prstGeom prst="rect">
+            <a:avLst/>
+          </a:prstGeom>
+          <a:noFill/>
+        </p:spPr>
+        <p:txBody>
+          <a:bodyPr wrap="square" rtlCol="0">
+            <a:spAutoFit/>
+          </a:bodyPr>
+          <a:lstStyle/>
+          <a:p>
+            <a:r>
+              <a:rPr lang="en-US" dirty="0"/>
+              <a:t>#    </a:t>
+            </a:r>
+            <a:r>
+              <a:rPr lang="en-US"/>
+              <a:t>1 </a:t>
+            </a:r>
+            <a:r>
+              <a:rPr lang="en-US" smtClean="0"/>
+              <a:t>- </a:t>
+            </a:r>
+            <a:r>
+              <a:rPr lang="en-US" dirty="0"/>
+              <a:t>Building you USB </a:t>
+            </a:r>
+            <a:r>
+              <a:rPr lang="en-US" dirty="0" err="1"/>
+              <a:t>thumbdrive</a:t>
+            </a:r>
+            <a:r>
+              <a:rPr lang="en-US" dirty="0"/>
+              <a:t> (optional)</a:t>
+            </a:r>
+          </a:p>
+          <a:p>
+            <a:r>
+              <a:rPr lang="en-US" dirty="0"/>
+              <a:t>#    2 - Process Explorer</a:t>
+            </a:r>
+          </a:p>
+          <a:p>
+            <a:r>
+              <a:rPr lang="en-US" dirty="0"/>
+              <a:t>#    3 - Process Monitor</a:t>
+            </a:r>
+          </a:p>
+          <a:p>
+            <a:r>
+              <a:rPr lang="en-US" dirty="0"/>
+              <a:t>#    4 - Process Monitor – Examples</a:t>
+            </a:r>
+          </a:p>
+          <a:p>
+            <a:r>
+              <a:rPr lang="en-US" dirty="0"/>
+              <a:t>#    5 - </a:t>
+            </a:r>
+            <a:r>
+              <a:rPr lang="en-US" dirty="0" err="1"/>
+              <a:t>Autoruns</a:t>
+            </a:r>
+            <a:r>
+              <a:rPr lang="en-US" dirty="0"/>
+              <a:t> and </a:t>
+            </a:r>
+            <a:r>
+              <a:rPr lang="en-US" dirty="0" err="1"/>
+              <a:t>MSConfig</a:t>
+            </a:r>
+            <a:endParaRPr lang="en-US" dirty="0"/>
+          </a:p>
+          <a:p>
+            <a:r>
+              <a:rPr lang="en-US" dirty="0"/>
+              <a:t>#    6 </a:t>
+            </a:r>
+            <a:r>
+              <a:rPr lang="en-US" dirty="0" smtClean="0"/>
+              <a:t>- </a:t>
+            </a:r>
+            <a:r>
+              <a:rPr lang="en-US" dirty="0" err="1"/>
+              <a:t>RAMMap</a:t>
+            </a:r>
+            <a:endParaRPr lang="en-US" dirty="0"/>
+          </a:p>
+          <a:p>
+            <a:r>
+              <a:rPr lang="en-US" dirty="0"/>
+              <a:t>#    7 </a:t>
+            </a:r>
+            <a:r>
+              <a:rPr lang="en-US" dirty="0" smtClean="0"/>
+              <a:t>- </a:t>
+            </a:r>
+            <a:r>
+              <a:rPr lang="en-US" dirty="0" err="1"/>
+              <a:t>VMMap</a:t>
+            </a:r>
+            <a:endParaRPr lang="en-US" dirty="0"/>
+          </a:p>
+          <a:p>
+            <a:r>
+              <a:rPr lang="en-US" dirty="0"/>
+              <a:t>#  13 </a:t>
+            </a:r>
+            <a:r>
+              <a:rPr lang="en-US" dirty="0" smtClean="0"/>
+              <a:t>- </a:t>
+            </a:r>
+            <a:r>
+              <a:rPr lang="en-US" dirty="0"/>
+              <a:t>WinDbg</a:t>
+            </a:r>
+          </a:p>
+          <a:p>
+            <a:r>
+              <a:rPr lang="en-US" dirty="0"/>
+              <a:t>#  14 - WinDbg – SOS</a:t>
+            </a:r>
+          </a:p>
+          <a:p>
+            <a:r>
+              <a:rPr lang="en-US" dirty="0"/>
+              <a:t>#  15 - WinDbg - </a:t>
+            </a:r>
+            <a:r>
+              <a:rPr lang="en-US" dirty="0" err="1"/>
+              <a:t>Bugchecks</a:t>
+            </a:r>
+            <a:r>
+              <a:rPr lang="en-US" dirty="0"/>
+              <a:t> (BSOD)</a:t>
+            </a:r>
+          </a:p>
+          <a:p>
+            <a:r>
+              <a:rPr lang="en-US" dirty="0"/>
+              <a:t>#  19 - WinDbg – OCA</a:t>
+            </a:r>
+          </a:p>
+          <a:p>
+            <a:r>
+              <a:rPr lang="en-US" dirty="0"/>
+              <a:t>#  20 - WinDbg - Basic Commands</a:t>
+            </a:r>
+          </a:p>
+          <a:p>
+            <a:r>
+              <a:rPr lang="en-US" dirty="0"/>
+              <a:t>#  21 - WinDbg - Memory User Mode</a:t>
+            </a:r>
+          </a:p>
+          <a:p>
+            <a:r>
+              <a:rPr lang="en-US" dirty="0"/>
+              <a:t>#  22 - WinDbg - Memory Kernel Mode</a:t>
+            </a:r>
+          </a:p>
+          <a:p>
+            <a:r>
+              <a:rPr lang="en-US" dirty="0"/>
+              <a:t>#  24 - WinDbg - Critical Sections</a:t>
+            </a:r>
+          </a:p>
+          <a:p>
+            <a:r>
+              <a:rPr lang="en-US" dirty="0"/>
+              <a:t>#  25 - WinDbg – Events</a:t>
+            </a:r>
+          </a:p>
+        </p:txBody>
+      </p:sp>
+      <p:sp>
+        <p:nvSpPr>
+          <p:cNvPr id="7" name="TextBox 6"/>
+          <p:cNvSpPr txBox="1"/>
+          <p:nvPr/>
+        </p:nvSpPr>
+        <p:spPr>
+          <a:xfrm>
+            <a:off x="6827520" y="1549400"/>
+            <a:ext cx="5029200" cy="4524315"/>
+          </a:xfrm>
+          <a:prstGeom prst="rect">
+            <a:avLst/>
+          </a:prstGeom>
+          <a:noFill/>
+        </p:spPr>
+        <p:txBody>
+          <a:bodyPr wrap="square" rtlCol="0">
+            <a:spAutoFit/>
+          </a:bodyPr>
+          <a:lstStyle/>
+          <a:p>
+            <a:r>
+              <a:rPr lang="en-US" dirty="0"/>
+              <a:t>#  26 - WinDbg - Semaphores, </a:t>
+            </a:r>
+            <a:r>
+              <a:rPr lang="en-US" dirty="0" err="1"/>
+              <a:t>Mutexes</a:t>
+            </a:r>
+            <a:r>
+              <a:rPr lang="en-US" dirty="0"/>
+              <a:t> and Timers</a:t>
+            </a:r>
+          </a:p>
+          <a:p>
+            <a:r>
+              <a:rPr lang="en-US" dirty="0"/>
+              <a:t>#  27 - WinDbg - Configure Kernel Debugging</a:t>
+            </a:r>
+          </a:p>
+          <a:p>
+            <a:r>
+              <a:rPr lang="en-US" dirty="0"/>
+              <a:t>#  28 - WinDbg – Scheduling</a:t>
+            </a:r>
+          </a:p>
+          <a:p>
+            <a:r>
+              <a:rPr lang="en-US" dirty="0"/>
+              <a:t>#  29 - WinDbg - ETW Logging</a:t>
+            </a:r>
+          </a:p>
+          <a:p>
+            <a:r>
+              <a:rPr lang="en-US" dirty="0"/>
+              <a:t>#  30 - MCTS Windows Internals</a:t>
+            </a:r>
+          </a:p>
+          <a:p>
+            <a:r>
+              <a:rPr lang="en-US" dirty="0"/>
+              <a:t>#  89 - Symbol Folder Tools</a:t>
+            </a:r>
+          </a:p>
+          <a:p>
+            <a:r>
+              <a:rPr lang="en-US" dirty="0"/>
+              <a:t>#  94 - </a:t>
+            </a:r>
+            <a:r>
+              <a:rPr lang="en-US" dirty="0" err="1"/>
+              <a:t>Sysinternals</a:t>
+            </a:r>
+            <a:r>
+              <a:rPr lang="en-US" dirty="0"/>
+              <a:t> Strings, </a:t>
+            </a:r>
+            <a:r>
+              <a:rPr lang="en-US" dirty="0" err="1"/>
+              <a:t>FindStr</a:t>
+            </a:r>
+            <a:r>
+              <a:rPr lang="en-US" dirty="0"/>
+              <a:t>, !</a:t>
+            </a:r>
+            <a:r>
+              <a:rPr lang="en-US" dirty="0" err="1"/>
+              <a:t>pde.ssz</a:t>
+            </a:r>
+            <a:endParaRPr lang="en-US" dirty="0"/>
+          </a:p>
+          <a:p>
+            <a:r>
+              <a:rPr lang="en-US" dirty="0"/>
+              <a:t>#  96 - Writing a Debugger Extension Part 1</a:t>
+            </a:r>
+          </a:p>
+          <a:p>
+            <a:r>
+              <a:rPr lang="en-US" dirty="0"/>
+              <a:t>#  97 - Writing a Debugger Extension Part 2</a:t>
+            </a:r>
+          </a:p>
+          <a:p>
+            <a:r>
+              <a:rPr lang="en-US" dirty="0"/>
+              <a:t>#  98 - Writing a Debugger Extension Part 3</a:t>
+            </a:r>
+          </a:p>
+          <a:p>
+            <a:r>
+              <a:rPr lang="en-US" dirty="0"/>
+              <a:t>#  99 - Writing a Debugger Extension Part 4</a:t>
+            </a:r>
+          </a:p>
+          <a:p>
+            <a:r>
+              <a:rPr lang="en-US" dirty="0"/>
+              <a:t>#101 - Writing a Debugger Extension Part 5</a:t>
+            </a:r>
+          </a:p>
+          <a:p>
+            <a:r>
+              <a:rPr lang="en-US" dirty="0"/>
+              <a:t>#102 - Writing a Debugger Extension Part 6</a:t>
+            </a:r>
+          </a:p>
+          <a:p>
+            <a:r>
+              <a:rPr lang="en-US" dirty="0"/>
+              <a:t>#103 - Writing a Debugger Extension Part 7</a:t>
+            </a:r>
+          </a:p>
+          <a:p>
+            <a:r>
+              <a:rPr lang="en-US" dirty="0"/>
+              <a:t>#104 - Writing a Debugger Extension Part </a:t>
+            </a:r>
+            <a:r>
+              <a:rPr lang="en-US" dirty="0" smtClean="0"/>
+              <a:t>8</a:t>
+            </a:r>
+          </a:p>
+          <a:p>
+            <a:r>
+              <a:rPr lang="en-US" dirty="0"/>
+              <a:t>#105 - Writing a Debugger Extension Part </a:t>
+            </a:r>
+            <a:r>
+              <a:rPr lang="en-US" dirty="0" smtClean="0"/>
+              <a:t>9</a:t>
+            </a:r>
+            <a:endParaRPr lang="en-US" dirty="0"/>
+          </a:p>
+        </p:txBody>
+      </p:sp>
+    </p:spTree>
+    <p:extLst>
+      <p:ext uri="{BB962C8B-B14F-4D97-AF65-F5344CB8AC3E}">
+        <p14:creationId xmlns:p14="http://schemas.microsoft.com/office/powerpoint/2010/main" val="612111567"/>
+      </p:ext>
+    </p:extLst>
+  </p:cSld>
+  <p:clrMapOvr>
+    <a:masterClrMapping/>
+  </p:clrMapOvr>
+  <mc:AlternateContent xmlns:mc="http://schemas.openxmlformats.org/markup-compatibility/2006" xmlns:p14="http://schemas.microsoft.com/office/powerpoint/2010/main">
+    <mc:Choice Requires="p14">
+      <p:transition spd="slow" p14:dur="1500" advClick="0">
+        <p:split orient="vert"/>
+      </p:transition>
+    </mc:Choice>
+    <mc:Fallback xmlns="">
+      <p:transition spd="slow" advClick="0">
+        <p:split orient="vert"/>
+      </p:transition>
+    </mc:Fallback>
+  </mc:AlternateContent>
+  <p:timing>
+    <p:tnLst>
+      <p:par>
+        <p:cTn id="1" dur="indefinite" restart="never" nodeType="tmRoot"/>
+      </p:par>
+    </p:tnLst>
+  </p:timing>
+</p:sld>
+</file>
+
 <file path=ppt/slides/slide6.xml><?xml version="1.0" encoding="utf-8"?>
 <p:sld xmlns:a="http://schemas.openxmlformats.org/drawingml/2006/main" xmlns:r="http://schemas.openxmlformats.org/officeDocument/2006/relationships" xmlns:p="http://schemas.openxmlformats.org/presentationml/2006/main" show="0">
   <p:cSld>
@@ -30331,7 +30784,7 @@
       </p:sp>
       <p:pic>
         <p:nvPicPr>
-          <p:cNvPr id="4" name="Picture 3"/>
+          <p:cNvPr id="2" name="Picture 1"/>
           <p:cNvPicPr>
             <a:picLocks noChangeAspect="1"/>
           </p:cNvPicPr>
@@ -30351,8 +30804,8 @@
         </p:blipFill>
         <p:spPr>
           <a:xfrm>
-            <a:off x="2721827" y="904154"/>
-            <a:ext cx="6748346" cy="5049693"/>
+            <a:off x="2677354" y="1067938"/>
+            <a:ext cx="6837293" cy="5111245"/>
           </a:xfrm>
           <a:prstGeom prst="rect">
             <a:avLst/>
@@ -30375,6 +30828,339 @@
     </mc:Choice>
     <mc:Fallback xmlns="">
       <p:transition spd="slow" advClick="0"/>
+    </mc:Fallback>
+  </mc:AlternateContent>
+  <p:timing>
+    <p:tnLst>
+      <p:par>
+        <p:cTn id="1" dur="indefinite" restart="never" nodeType="tmRoot"/>
+      </p:par>
+    </p:tnLst>
+  </p:timing>
+</p:sld>
+</file>
+
+<file path=ppt/slides/slide60.xml><?xml version="1.0" encoding="utf-8"?>
+<p:sld xmlns:a="http://schemas.openxmlformats.org/drawingml/2006/main" xmlns:r="http://schemas.openxmlformats.org/officeDocument/2006/relationships" xmlns:p="http://schemas.openxmlformats.org/presentationml/2006/main" show="0">
+  <p:cSld>
+    <p:spTree>
+      <p:nvGrpSpPr>
+        <p:cNvPr id="1" name=""/>
+        <p:cNvGrpSpPr/>
+        <p:nvPr/>
+      </p:nvGrpSpPr>
+      <p:grpSpPr>
+        <a:xfrm>
+          <a:off x="0" y="0"/>
+          <a:ext cx="0" cy="0"/>
+          <a:chOff x="0" y="0"/>
+          <a:chExt cx="0" cy="0"/>
+        </a:xfrm>
+      </p:grpSpPr>
+      <p:sp>
+        <p:nvSpPr>
+          <p:cNvPr id="2" name="TextBox 1"/>
+          <p:cNvSpPr txBox="1"/>
+          <p:nvPr/>
+        </p:nvSpPr>
+        <p:spPr>
+          <a:xfrm>
+            <a:off x="5822957" y="6184900"/>
+            <a:ext cx="622286" cy="369332"/>
+          </a:xfrm>
+          <a:prstGeom prst="rect">
+            <a:avLst/>
+          </a:prstGeom>
+          <a:noFill/>
+        </p:spPr>
+        <p:txBody>
+          <a:bodyPr wrap="none" rtlCol="0">
+            <a:spAutoFit/>
+          </a:bodyPr>
+          <a:lstStyle/>
+          <a:p>
+            <a:r>
+              <a:rPr lang="en-US" dirty="0" smtClean="0">
+                <a:hlinkClick r:id="rId2" action="ppaction://hlinksldjump"/>
+              </a:rPr>
+              <a:t>Back</a:t>
+            </a:r>
+            <a:endParaRPr lang="en-US" dirty="0"/>
+          </a:p>
+        </p:txBody>
+      </p:sp>
+      <p:sp>
+        <p:nvSpPr>
+          <p:cNvPr id="4" name="Title 1"/>
+          <p:cNvSpPr>
+            <a:spLocks noGrp="1"/>
+          </p:cNvSpPr>
+          <p:nvPr>
+            <p:ph type="title"/>
+          </p:nvPr>
+        </p:nvSpPr>
+        <p:spPr>
+          <a:xfrm>
+            <a:off x="838200" y="365125"/>
+            <a:ext cx="10515600" cy="574675"/>
+          </a:xfrm>
+        </p:spPr>
+        <p:txBody>
+          <a:bodyPr>
+            <a:normAutofit fontScale="90000"/>
+          </a:bodyPr>
+          <a:lstStyle/>
+          <a:p>
+            <a:pPr algn="ctr"/>
+            <a:r>
+              <a:rPr lang="en-US" dirty="0" smtClean="0"/>
+              <a:t>Channel 9</a:t>
+            </a:r>
+            <a:endParaRPr lang="en-US" dirty="0"/>
+          </a:p>
+        </p:txBody>
+      </p:sp>
+      <p:sp>
+        <p:nvSpPr>
+          <p:cNvPr id="3" name="TextBox 2"/>
+          <p:cNvSpPr txBox="1"/>
+          <p:nvPr/>
+        </p:nvSpPr>
+        <p:spPr>
+          <a:xfrm>
+            <a:off x="457200" y="1549400"/>
+            <a:ext cx="5577840" cy="3970318"/>
+          </a:xfrm>
+          <a:prstGeom prst="rect">
+            <a:avLst/>
+          </a:prstGeom>
+          <a:noFill/>
+        </p:spPr>
+        <p:txBody>
+          <a:bodyPr wrap="square" rtlCol="0">
+            <a:spAutoFit/>
+          </a:bodyPr>
+          <a:lstStyle/>
+          <a:p>
+            <a:r>
+              <a:rPr lang="en-US" dirty="0"/>
+              <a:t>#120 - Windows Management Instrumentation (optional)</a:t>
+            </a:r>
+          </a:p>
+          <a:p>
+            <a:r>
+              <a:rPr lang="en-US" dirty="0"/>
+              <a:t>#121 - </a:t>
+            </a:r>
+            <a:r>
+              <a:rPr lang="en-US" dirty="0" err="1"/>
+              <a:t>DebugDiag</a:t>
+            </a:r>
+            <a:r>
+              <a:rPr lang="en-US" dirty="0"/>
+              <a:t> Part 1</a:t>
+            </a:r>
+          </a:p>
+          <a:p>
+            <a:r>
+              <a:rPr lang="en-US" dirty="0"/>
+              <a:t>#122 - </a:t>
+            </a:r>
+            <a:r>
+              <a:rPr lang="en-US" dirty="0" err="1"/>
+              <a:t>DebugDiag</a:t>
+            </a:r>
+            <a:r>
+              <a:rPr lang="en-US" dirty="0"/>
+              <a:t> Part 2</a:t>
+            </a:r>
+          </a:p>
+          <a:p>
+            <a:r>
+              <a:rPr lang="en-US" dirty="0"/>
+              <a:t>#123 - </a:t>
+            </a:r>
+            <a:r>
+              <a:rPr lang="en-US" dirty="0" err="1"/>
+              <a:t>DebugDiag</a:t>
+            </a:r>
+            <a:r>
+              <a:rPr lang="en-US" dirty="0"/>
+              <a:t> Part 3</a:t>
+            </a:r>
+          </a:p>
+          <a:p>
+            <a:r>
+              <a:rPr lang="en-US" dirty="0"/>
+              <a:t>#124 - </a:t>
+            </a:r>
+            <a:r>
+              <a:rPr lang="en-US" dirty="0" err="1"/>
+              <a:t>DebugDiag</a:t>
+            </a:r>
+            <a:r>
+              <a:rPr lang="en-US" dirty="0"/>
+              <a:t> Part 4</a:t>
+            </a:r>
+          </a:p>
+          <a:p>
+            <a:r>
+              <a:rPr lang="en-US" dirty="0"/>
+              <a:t>#134 - Microsoft Symbol Proxy (</a:t>
+            </a:r>
+            <a:r>
+              <a:rPr lang="en-US" dirty="0" err="1"/>
+              <a:t>SymProxy</a:t>
+            </a:r>
+            <a:r>
+              <a:rPr lang="en-US" dirty="0"/>
+              <a:t>) (optional)</a:t>
+            </a:r>
+          </a:p>
+          <a:p>
+            <a:r>
+              <a:rPr lang="en-US" dirty="0"/>
+              <a:t>#135 - Debugging User Mode Crash Dumps Part 1</a:t>
+            </a:r>
+          </a:p>
+          <a:p>
+            <a:r>
+              <a:rPr lang="en-US" dirty="0"/>
+              <a:t>#136 - Debugging User Mode Crash Dumps Part 2</a:t>
+            </a:r>
+          </a:p>
+          <a:p>
+            <a:r>
+              <a:rPr lang="en-US" dirty="0"/>
+              <a:t>#137 - Debugging Kernel Mode Crashes and Hangs</a:t>
+            </a:r>
+          </a:p>
+          <a:p>
+            <a:r>
+              <a:rPr lang="en-US" dirty="0"/>
+              <a:t>#138 - Debugging - 'dx' Command Part 1</a:t>
+            </a:r>
+          </a:p>
+          <a:p>
+            <a:r>
+              <a:rPr lang="en-US" dirty="0"/>
+              <a:t>#139 - Debugging - 'dx' Command Part 2</a:t>
+            </a:r>
+          </a:p>
+          <a:p>
+            <a:r>
+              <a:rPr lang="en-US" dirty="0"/>
+              <a:t>#146 – </a:t>
+            </a:r>
+            <a:r>
+              <a:rPr lang="en-US" dirty="0" err="1"/>
+              <a:t>WinDiff</a:t>
+            </a:r>
+            <a:endParaRPr lang="en-US" dirty="0"/>
+          </a:p>
+          <a:p>
+            <a:r>
+              <a:rPr lang="en-US" dirty="0"/>
+              <a:t>#147 - Dependency Walker</a:t>
+            </a:r>
+          </a:p>
+          <a:p>
+            <a:r>
+              <a:rPr lang="en-US" dirty="0"/>
+              <a:t>#154 - Memory Footprint and </a:t>
+            </a:r>
+            <a:r>
+              <a:rPr lang="en-US" dirty="0" smtClean="0"/>
+              <a:t>Leaks</a:t>
+            </a:r>
+            <a:endParaRPr lang="en-US" dirty="0"/>
+          </a:p>
+        </p:txBody>
+      </p:sp>
+      <p:sp>
+        <p:nvSpPr>
+          <p:cNvPr id="7" name="TextBox 6"/>
+          <p:cNvSpPr txBox="1"/>
+          <p:nvPr/>
+        </p:nvSpPr>
+        <p:spPr>
+          <a:xfrm>
+            <a:off x="6553200" y="1549400"/>
+            <a:ext cx="5577840" cy="2031325"/>
+          </a:xfrm>
+          <a:prstGeom prst="rect">
+            <a:avLst/>
+          </a:prstGeom>
+          <a:noFill/>
+        </p:spPr>
+        <p:txBody>
+          <a:bodyPr wrap="square" rtlCol="0">
+            <a:spAutoFit/>
+          </a:bodyPr>
+          <a:lstStyle/>
+          <a:p>
+            <a:r>
+              <a:rPr lang="en-US" dirty="0"/>
+              <a:t>#161 - Troubleshooting a Slow PC (optional)</a:t>
+            </a:r>
+          </a:p>
+          <a:p>
+            <a:r>
+              <a:rPr lang="en-US" dirty="0"/>
+              <a:t>#167 - Debugging User Mode Crash Dumps </a:t>
+            </a:r>
+            <a:r>
+              <a:rPr lang="en-US" dirty="0" err="1"/>
+              <a:t>Redux</a:t>
+            </a:r>
+            <a:endParaRPr lang="en-US" dirty="0"/>
+          </a:p>
+          <a:p>
+            <a:r>
+              <a:rPr lang="en-US" dirty="0"/>
+              <a:t>#169 - Debugging Tools for Windows Team (optional)</a:t>
+            </a:r>
+          </a:p>
+          <a:p>
+            <a:r>
+              <a:rPr lang="en-US" dirty="0"/>
+              <a:t>#172 - Application Hangs</a:t>
+            </a:r>
+          </a:p>
+          <a:p>
+            <a:r>
+              <a:rPr lang="en-US" dirty="0"/>
+              <a:t>#173 - Troubleshooting with the Windows</a:t>
+            </a:r>
+          </a:p>
+          <a:p>
+            <a:r>
+              <a:rPr lang="en-US" dirty="0"/>
+              <a:t>#175 - Debugging the Network Stack</a:t>
+            </a:r>
+          </a:p>
+        </p:txBody>
+      </p:sp>
+    </p:spTree>
+    <p:extLst>
+      <p:ext uri="{BB962C8B-B14F-4D97-AF65-F5344CB8AC3E}">
+        <p14:creationId xmlns:p14="http://schemas.microsoft.com/office/powerpoint/2010/main" val="4206254986"/>
+      </p:ext>
+    </p:extLst>
+  </p:cSld>
+  <p:clrMapOvr>
+    <a:masterClrMapping/>
+  </p:clrMapOvr>
+  <mc:AlternateContent xmlns:mc="http://schemas.openxmlformats.org/markup-compatibility/2006" xmlns:p14="http://schemas.microsoft.com/office/powerpoint/2010/main">
+    <mc:Choice Requires="p14">
+      <p:transition spd="slow" p14:dur="1500" advClick="0">
+        <p:split orient="vert"/>
+      </p:transition>
+    </mc:Choice>
+    <mc:Fallback xmlns="">
+      <p:transition spd="slow" advClick="0">
+        <p:split orient="vert"/>
+      </p:transition>
     </mc:Fallback>
   </mc:AlternateContent>
   <p:timing>
@@ -30791,7 +31577,6 @@
               <a:rPr lang="en-US" sz="2800" dirty="0" smtClean="0"/>
               <a:t>)</a:t>
             </a:r>
-            <a:endParaRPr lang="en-US" sz="2800" dirty="0" smtClean="0"/>
           </a:p>
         </p:txBody>
       </p:sp>
@@ -31376,8 +32161,8 @@
         </p:nvSpPr>
         <p:spPr>
           <a:xfrm>
-            <a:off x="838200" y="3012936"/>
-            <a:ext cx="7482391" cy="1754326"/>
+            <a:off x="649798" y="2380639"/>
+            <a:ext cx="7482391" cy="2677656"/>
           </a:xfrm>
           <a:prstGeom prst="rect">
             <a:avLst/>
@@ -31395,19 +32180,19 @@
               <a:buChar char="•"/>
             </a:pPr>
             <a:r>
-              <a:rPr lang="en-US" dirty="0"/>
+              <a:rPr lang="en-US" sz="2400" dirty="0"/>
               <a:t>A</a:t>
             </a:r>
             <a:r>
-              <a:rPr lang="en-US" dirty="0" smtClean="0"/>
+              <a:rPr lang="en-US" sz="2400" dirty="0" smtClean="0"/>
               <a:t>llocated </a:t>
             </a:r>
             <a:r>
-              <a:rPr lang="en-US" dirty="0"/>
+              <a:rPr lang="en-US" sz="2400" dirty="0"/>
               <a:t>and deallocated by the object </a:t>
             </a:r>
             <a:r>
-              <a:rPr lang="en-US" dirty="0" smtClean="0"/>
+              <a:rPr lang="en-US" sz="2400" dirty="0" smtClean="0"/>
               <a:t>manager.</a:t>
             </a:r>
           </a:p>
@@ -31417,15 +32202,15 @@
               <a:buChar char="•"/>
             </a:pPr>
             <a:r>
-              <a:rPr lang="en-US" dirty="0" smtClean="0"/>
+              <a:rPr lang="en-US" sz="2400" dirty="0" smtClean="0"/>
               <a:t>The object </a:t>
             </a:r>
             <a:r>
-              <a:rPr lang="en-US" dirty="0"/>
+              <a:rPr lang="en-US" sz="2400" dirty="0"/>
               <a:t>manager creates and initializes an object header, which it uses to manage the </a:t>
             </a:r>
             <a:r>
-              <a:rPr lang="en-US" dirty="0" smtClean="0"/>
+              <a:rPr lang="en-US" sz="2400" dirty="0" smtClean="0"/>
               <a:t>objects.</a:t>
             </a:r>
           </a:p>
@@ -31435,30 +32220,30 @@
               <a:buChar char="•"/>
             </a:pPr>
             <a:r>
-              <a:rPr lang="en-US" dirty="0" smtClean="0"/>
+              <a:rPr lang="en-US" sz="2400" dirty="0" smtClean="0"/>
               <a:t>The memory </a:t>
             </a:r>
             <a:r>
-              <a:rPr lang="en-US" dirty="0"/>
+              <a:rPr lang="en-US" sz="2400" dirty="0"/>
               <a:t>manager defines the body of the section </a:t>
             </a:r>
             <a:r>
-              <a:rPr lang="en-US" dirty="0" smtClean="0"/>
+              <a:rPr lang="en-US" sz="2400" dirty="0" smtClean="0"/>
               <a:t>object and implements services </a:t>
             </a:r>
             <a:r>
-              <a:rPr lang="en-US" dirty="0"/>
+              <a:rPr lang="en-US" sz="2400" dirty="0"/>
               <a:t>that user-mode threads can call to retrieve and change the attributes stored in the body </a:t>
             </a:r>
             <a:r>
-              <a:rPr lang="en-US" dirty="0" smtClean="0"/>
+              <a:rPr lang="en-US" sz="2400" dirty="0" smtClean="0"/>
               <a:t>of section </a:t>
             </a:r>
             <a:r>
-              <a:rPr lang="en-US" dirty="0"/>
+              <a:rPr lang="en-US" sz="2400" dirty="0"/>
               <a:t>objects.</a:t>
             </a:r>
-            <a:endParaRPr lang="en-US" sz="2000" dirty="0"/>
+            <a:endParaRPr lang="en-US" sz="2800" dirty="0"/>
           </a:p>
         </p:txBody>
       </p:sp>

</xml_diff>